<commit_message>
Added links for GitHub repo to PPTX slides
</commit_message>
<xml_diff>
--- a/Courses/Applied-Programmer/Programming-Fundamentals/01-Системи-за-контрол-на-версиите/01.Системи-за-контрол-на-версиите.pptx
+++ b/Courses/Applied-Programmer/Programming-Fundamentals/01-Системи-за-контрол-на-версиите/01.Системи-за-контрол-на-версиите.pptx
@@ -347,7 +347,7 @@
             <a:fld id="{FE5B4EDC-59C0-49C7-8ADA-5A781B329E02}" type="datetimeFigureOut">
               <a:rPr lang="en-US"/>
               <a:pPr/>
-              <a:t>10-Nov-20</a:t>
+              <a:t>19-Nov-20</a:t>
             </a:fld>
             <a:endParaRPr dirty="0"/>
           </a:p>
@@ -645,7 +645,7 @@
             <a:fld id="{F2D8D46A-B586-417D-BFBD-8C8FE0AAF762}" type="datetimeFigureOut">
               <a:rPr lang="en-US" smtClean="0"/>
               <a:pPr/>
-              <a:t>10-Nov-20</a:t>
+              <a:t>19-Nov-20</a:t>
             </a:fld>
             <a:endParaRPr lang="en-US" dirty="0"/>
           </a:p>
@@ -5485,10 +5485,10 @@
         </p:nvGrpSpPr>
         <p:grpSpPr>
           <a:xfrm>
-            <a:off x="745783" y="3624633"/>
-            <a:ext cx="5043827" cy="2524722"/>
-            <a:chOff x="745783" y="3624633"/>
-            <a:chExt cx="5043827" cy="2524722"/>
+            <a:off x="326777" y="3624633"/>
+            <a:ext cx="5462833" cy="2683682"/>
+            <a:chOff x="326777" y="3624633"/>
+            <a:chExt cx="5462833" cy="2683682"/>
           </a:xfrm>
         </p:grpSpPr>
         <p:pic>
@@ -5545,7 +5545,7 @@
           </p:blipFill>
           <p:spPr bwMode="auto">
             <a:xfrm>
-              <a:off x="745783" y="4076772"/>
+              <a:off x="349602" y="4225063"/>
               <a:ext cx="2175525" cy="761165"/>
             </a:xfrm>
             <a:prstGeom prst="roundRect">
@@ -5584,7 +5584,7 @@
           </p:nvSpPr>
           <p:spPr bwMode="auto">
             <a:xfrm>
-              <a:off x="760413" y="4998598"/>
+              <a:off x="349602" y="5068371"/>
               <a:ext cx="3187614" cy="444343"/>
             </a:xfrm>
             <a:prstGeom prst="rect">
@@ -5819,7 +5819,7 @@
                 <a:t>Учителски</a:t>
               </a:r>
               <a:r>
-                <a:rPr lang="bg-BG"/>
+                <a:rPr lang="bg-BG" dirty="0"/>
                 <a:t> екип</a:t>
               </a:r>
             </a:p>
@@ -5841,7 +5841,7 @@
           </p:nvSpPr>
           <p:spPr bwMode="auto">
             <a:xfrm>
-              <a:off x="760412" y="5403725"/>
+              <a:off x="326777" y="5502603"/>
               <a:ext cx="3187613" cy="382788"/>
             </a:xfrm>
             <a:prstGeom prst="rect">
@@ -6075,7 +6075,7 @@
             </a:lstStyle>
             <a:p>
               <a:r>
-                <a:rPr lang="bg-BG"/>
+                <a:rPr lang="bg-BG" dirty="0"/>
                 <a:t>Обучение за ИТ кариера</a:t>
               </a:r>
             </a:p>
@@ -6097,8 +6097,8 @@
           </p:nvSpPr>
           <p:spPr bwMode="auto">
             <a:xfrm>
-              <a:off x="760412" y="5690893"/>
-              <a:ext cx="3810000" cy="458462"/>
+              <a:off x="326777" y="5956561"/>
+              <a:ext cx="3810000" cy="351754"/>
             </a:xfrm>
             <a:prstGeom prst="rect">
               <a:avLst/>
@@ -6328,16 +6328,311 @@
             </a:lstStyle>
             <a:p>
               <a:r>
-                <a:rPr lang="en-GB">
-                  <a:hlinkClick r:id="rId8"/>
+                <a:rPr lang="en-GB" dirty="0">
+                  <a:solidFill>
+                    <a:srgbClr val="F6C781"/>
+                  </a:solidFill>
+                  <a:hlinkClick r:id="rId8">
+                    <a:extLst>
+                      <a:ext uri="{A12FA001-AC4F-418D-AE19-62706E023703}">
+                        <ahyp:hlinkClr xmlns:ahyp="http://schemas.microsoft.com/office/drawing/2018/hyperlinkcolor" val="tx"/>
+                      </a:ext>
+                    </a:extLst>
+                  </a:hlinkClick>
                 </a:rPr>
-                <a:t>https://it-kariera.mon.bg/e-learning/</a:t>
+                <a:t>https://it-kariera.mon</a:t>
               </a:r>
-              <a:endParaRPr lang="en-GB"/>
+              <a:r>
+                <a:rPr lang="en-GB" dirty="0">
+                  <a:solidFill>
+                    <a:srgbClr val="E8BB79"/>
+                  </a:solidFill>
+                  <a:hlinkClick r:id="rId8">
+                    <a:extLst>
+                      <a:ext uri="{A12FA001-AC4F-418D-AE19-62706E023703}">
+                        <ahyp:hlinkClr xmlns:ahyp="http://schemas.microsoft.com/office/drawing/2018/hyperlinkcolor" val="tx"/>
+                      </a:ext>
+                    </a:extLst>
+                  </a:hlinkClick>
+                </a:rPr>
+                <a:t>.bg/e-learning</a:t>
+              </a:r>
+              <a:r>
+                <a:rPr lang="en-GB" dirty="0">
+                  <a:solidFill>
+                    <a:srgbClr val="F6C781"/>
+                  </a:solidFill>
+                  <a:hlinkClick r:id="rId8">
+                    <a:extLst>
+                      <a:ext uri="{A12FA001-AC4F-418D-AE19-62706E023703}">
+                        <ahyp:hlinkClr xmlns:ahyp="http://schemas.microsoft.com/office/drawing/2018/hyperlinkcolor" val="tx"/>
+                      </a:ext>
+                    </a:extLst>
+                  </a:hlinkClick>
+                </a:rPr>
+                <a:t>/</a:t>
+              </a:r>
+              <a:endParaRPr lang="en-GB" dirty="0"/>
             </a:p>
           </p:txBody>
         </p:sp>
       </p:grpSp>
+      <p:sp>
+        <p:nvSpPr>
+          <p:cNvPr id="27" name="Text Placeholder 11">
+            <a:extLst>
+              <a:ext uri="{FF2B5EF4-FFF2-40B4-BE49-F238E27FC236}">
+                <a16:creationId xmlns:a16="http://schemas.microsoft.com/office/drawing/2014/main" id="{0234C996-1B68-4D93-8B54-CCC8756CD8B3}"/>
+              </a:ext>
+            </a:extLst>
+          </p:cNvPr>
+          <p:cNvSpPr txBox="1">
+            <a:spLocks/>
+          </p:cNvSpPr>
+          <p:nvPr/>
+        </p:nvSpPr>
+        <p:spPr bwMode="auto">
+          <a:xfrm>
+            <a:off x="303212" y="6361669"/>
+            <a:ext cx="11885613" cy="351754"/>
+          </a:xfrm>
+          <a:prstGeom prst="rect">
+            <a:avLst/>
+          </a:prstGeom>
+          <a:noFill/>
+          <a:effectLst/>
+        </p:spPr>
+        <p:txBody>
+          <a:bodyPr vert="horz" wrap="square" lIns="36000" tIns="36000" rIns="36000" bIns="36000" rtlCol="0" anchor="ctr" anchorCtr="0">
+            <a:spAutoFit/>
+          </a:bodyPr>
+          <a:lstStyle>
+            <a:lvl1pPr marL="0" indent="0" algn="l" defTabSz="1218987" rtl="0" eaLnBrk="1" fontAlgn="base" latinLnBrk="0" hangingPunct="1">
+              <a:lnSpc>
+                <a:spcPct val="105000"/>
+              </a:lnSpc>
+              <a:spcBef>
+                <a:spcPct val="0"/>
+              </a:spcBef>
+              <a:spcAft>
+                <a:spcPct val="0"/>
+              </a:spcAft>
+              <a:buClr>
+                <a:srgbClr val="F2B254"/>
+              </a:buClr>
+              <a:buSzPct val="100000"/>
+              <a:buFont typeface="Wingdings" panose="05000000000000000000" pitchFamily="2" charset="2"/>
+              <a:buNone/>
+              <a:defRPr lang="en-US" sz="1800" b="1" kern="1200" dirty="0" smtClean="0">
+                <a:solidFill>
+                  <a:srgbClr val="F27A44"/>
+                </a:solidFill>
+                <a:effectLst/>
+                <a:latin typeface="+mn-lt"/>
+                <a:ea typeface="+mn-ea"/>
+                <a:cs typeface="+mn-cs"/>
+              </a:defRPr>
+            </a:lvl1pPr>
+            <a:lvl2pPr marL="609493" indent="-231606" algn="l" defTabSz="1218987" rtl="0" eaLnBrk="1" latinLnBrk="0" hangingPunct="1">
+              <a:lnSpc>
+                <a:spcPct val="105000"/>
+              </a:lnSpc>
+              <a:spcBef>
+                <a:spcPts val="600"/>
+              </a:spcBef>
+              <a:spcAft>
+                <a:spcPts val="600"/>
+              </a:spcAft>
+              <a:buClr>
+                <a:schemeClr val="accent1"/>
+              </a:buClr>
+              <a:buSzPct val="80000"/>
+              <a:buFont typeface="Wingdings" panose="05000000000000000000" pitchFamily="2" charset="2"/>
+              <a:buChar char="§"/>
+              <a:defRPr sz="3200" b="0" kern="1200">
+                <a:solidFill>
+                  <a:schemeClr val="tx1"/>
+                </a:solidFill>
+                <a:latin typeface="+mn-lt"/>
+                <a:ea typeface="+mn-ea"/>
+                <a:cs typeface="+mn-cs"/>
+              </a:defRPr>
+            </a:lvl2pPr>
+            <a:lvl3pPr marL="914240" indent="-231606" algn="l" defTabSz="1218987" rtl="0" eaLnBrk="1" latinLnBrk="0" hangingPunct="1">
+              <a:lnSpc>
+                <a:spcPct val="105000"/>
+              </a:lnSpc>
+              <a:spcBef>
+                <a:spcPts val="600"/>
+              </a:spcBef>
+              <a:spcAft>
+                <a:spcPts val="600"/>
+              </a:spcAft>
+              <a:buClr>
+                <a:srgbClr val="EF9A1D"/>
+              </a:buClr>
+              <a:buSzPct val="80000"/>
+              <a:buFont typeface="Wingdings" panose="05000000000000000000" pitchFamily="2" charset="2"/>
+              <a:buChar char="§"/>
+              <a:defRPr sz="3000" b="0" kern="1200">
+                <a:solidFill>
+                  <a:schemeClr val="tx1"/>
+                </a:solidFill>
+                <a:latin typeface="+mn-lt"/>
+                <a:ea typeface="+mn-ea"/>
+                <a:cs typeface="+mn-cs"/>
+              </a:defRPr>
+            </a:lvl3pPr>
+            <a:lvl4pPr marL="1218987" indent="-231606" algn="l" defTabSz="1218987" rtl="0" eaLnBrk="1" latinLnBrk="0" hangingPunct="1">
+              <a:lnSpc>
+                <a:spcPct val="105000"/>
+              </a:lnSpc>
+              <a:spcBef>
+                <a:spcPts val="600"/>
+              </a:spcBef>
+              <a:spcAft>
+                <a:spcPts val="600"/>
+              </a:spcAft>
+              <a:buClr>
+                <a:srgbClr val="ED9411"/>
+              </a:buClr>
+              <a:buSzPct val="80000"/>
+              <a:buFont typeface="Wingdings" panose="05000000000000000000" pitchFamily="2" charset="2"/>
+              <a:buChar char="§"/>
+              <a:defRPr sz="2800" b="0" kern="1200">
+                <a:solidFill>
+                  <a:schemeClr val="tx1"/>
+                </a:solidFill>
+                <a:latin typeface="+mn-lt"/>
+                <a:ea typeface="+mn-ea"/>
+                <a:cs typeface="+mn-cs"/>
+              </a:defRPr>
+            </a:lvl4pPr>
+            <a:lvl5pPr marL="1523733" indent="-231606" algn="l" defTabSz="1218987" rtl="0" eaLnBrk="1" latinLnBrk="0" hangingPunct="1">
+              <a:lnSpc>
+                <a:spcPct val="105000"/>
+              </a:lnSpc>
+              <a:spcBef>
+                <a:spcPts val="600"/>
+              </a:spcBef>
+              <a:spcAft>
+                <a:spcPts val="600"/>
+              </a:spcAft>
+              <a:buClr>
+                <a:srgbClr val="E28D10"/>
+              </a:buClr>
+              <a:buSzPct val="80000"/>
+              <a:buFont typeface="Wingdings" panose="05000000000000000000" pitchFamily="2" charset="2"/>
+              <a:buChar char="§"/>
+              <a:defRPr sz="2600" b="0" kern="1200">
+                <a:solidFill>
+                  <a:schemeClr val="tx1"/>
+                </a:solidFill>
+                <a:latin typeface="+mn-lt"/>
+                <a:ea typeface="+mn-ea"/>
+                <a:cs typeface="+mn-cs"/>
+              </a:defRPr>
+            </a:lvl5pPr>
+            <a:lvl6pPr marL="1828480" indent="-231606" algn="l" defTabSz="1218987" rtl="0" eaLnBrk="1" latinLnBrk="0" hangingPunct="1">
+              <a:lnSpc>
+                <a:spcPct val="90000"/>
+              </a:lnSpc>
+              <a:spcBef>
+                <a:spcPts val="800"/>
+              </a:spcBef>
+              <a:buClr>
+                <a:schemeClr val="accent1"/>
+              </a:buClr>
+              <a:buSzPct val="80000"/>
+              <a:buFont typeface="Arial" pitchFamily="34" charset="0"/>
+              <a:buChar char="•"/>
+              <a:defRPr sz="2000" kern="1200">
+                <a:solidFill>
+                  <a:schemeClr val="tx1"/>
+                </a:solidFill>
+                <a:latin typeface="+mn-lt"/>
+                <a:ea typeface="+mn-ea"/>
+                <a:cs typeface="+mn-cs"/>
+              </a:defRPr>
+            </a:lvl6pPr>
+            <a:lvl7pPr marL="2133227" indent="-231606" algn="l" defTabSz="1218987" rtl="0" eaLnBrk="1" latinLnBrk="0" hangingPunct="1">
+              <a:lnSpc>
+                <a:spcPct val="90000"/>
+              </a:lnSpc>
+              <a:spcBef>
+                <a:spcPts val="800"/>
+              </a:spcBef>
+              <a:buClr>
+                <a:schemeClr val="accent1"/>
+              </a:buClr>
+              <a:buSzPct val="80000"/>
+              <a:buFont typeface="Arial" pitchFamily="34" charset="0"/>
+              <a:buChar char="•"/>
+              <a:defRPr sz="2000" kern="1200">
+                <a:solidFill>
+                  <a:schemeClr val="tx1"/>
+                </a:solidFill>
+                <a:latin typeface="+mn-lt"/>
+                <a:ea typeface="+mn-ea"/>
+                <a:cs typeface="+mn-cs"/>
+              </a:defRPr>
+            </a:lvl7pPr>
+            <a:lvl8pPr marL="2437972" indent="-231606" algn="l" defTabSz="1218987" rtl="0" eaLnBrk="1" latinLnBrk="0" hangingPunct="1">
+              <a:lnSpc>
+                <a:spcPct val="90000"/>
+              </a:lnSpc>
+              <a:spcBef>
+                <a:spcPts val="800"/>
+              </a:spcBef>
+              <a:buClr>
+                <a:schemeClr val="accent1"/>
+              </a:buClr>
+              <a:buSzPct val="80000"/>
+              <a:buFont typeface="Arial" pitchFamily="34" charset="0"/>
+              <a:buChar char="•"/>
+              <a:defRPr sz="2000" kern="1200" baseline="0">
+                <a:solidFill>
+                  <a:schemeClr val="tx1"/>
+                </a:solidFill>
+                <a:latin typeface="+mn-lt"/>
+                <a:ea typeface="+mn-ea"/>
+                <a:cs typeface="+mn-cs"/>
+              </a:defRPr>
+            </a:lvl8pPr>
+            <a:lvl9pPr marL="2742720" indent="-231606" algn="l" defTabSz="1218987" rtl="0" eaLnBrk="1" latinLnBrk="0" hangingPunct="1">
+              <a:lnSpc>
+                <a:spcPct val="90000"/>
+              </a:lnSpc>
+              <a:spcBef>
+                <a:spcPts val="800"/>
+              </a:spcBef>
+              <a:buClr>
+                <a:schemeClr val="accent1"/>
+              </a:buClr>
+              <a:buSzPct val="80000"/>
+              <a:buFont typeface="Arial" pitchFamily="34" charset="0"/>
+              <a:buChar char="•"/>
+              <a:defRPr sz="2000" kern="1200" baseline="0">
+                <a:solidFill>
+                  <a:schemeClr val="tx1"/>
+                </a:solidFill>
+                <a:latin typeface="+mn-lt"/>
+                <a:ea typeface="+mn-ea"/>
+                <a:cs typeface="+mn-cs"/>
+              </a:defRPr>
+            </a:lvl9pPr>
+          </a:lstStyle>
+          <a:p>
+            <a:r>
+              <a:rPr lang="en-US" dirty="0">
+                <a:hlinkClick r:id="rId9"/>
+              </a:rPr>
+              <a:t>https://github.com/BG-IT-Edu/School-Programming/tree/main/Courses/Applied-Programmer/Programming-Fundamentals</a:t>
+            </a:r>
+            <a:endParaRPr lang="en-GB" dirty="0"/>
+          </a:p>
+        </p:txBody>
+      </p:sp>
     </p:spTree>
     <p:extLst>
       <p:ext uri="{BB962C8B-B14F-4D97-AF65-F5344CB8AC3E}">
@@ -11180,37 +11475,257 @@
       </p:sp>
       <p:sp>
         <p:nvSpPr>
-          <p:cNvPr id="3" name="Text Placeholder 2"/>
-          <p:cNvSpPr>
-            <a:spLocks noGrp="1"/>
+          <p:cNvPr id="7" name="Text Placeholder 11">
+            <a:extLst>
+              <a:ext uri="{FF2B5EF4-FFF2-40B4-BE49-F238E27FC236}">
+                <a16:creationId xmlns:a16="http://schemas.microsoft.com/office/drawing/2014/main" id="{3E4A0819-C69C-40DE-8DCD-6732932F3986}"/>
+              </a:ext>
+            </a:extLst>
+          </p:cNvPr>
+          <p:cNvSpPr txBox="1">
+            <a:spLocks/>
           </p:cNvSpPr>
-          <p:nvPr>
-            <p:ph type="body" sz="quarter" idx="10"/>
-          </p:nvPr>
+          <p:nvPr/>
         </p:nvSpPr>
-        <p:spPr>
+        <p:spPr bwMode="auto">
           <a:xfrm>
-            <a:off x="1529384" y="6400802"/>
-            <a:ext cx="10482604" cy="351754"/>
+            <a:off x="214600" y="6400800"/>
+            <a:ext cx="11885613" cy="351754"/>
           </a:xfrm>
+          <a:prstGeom prst="rect">
+            <a:avLst/>
+          </a:prstGeom>
+          <a:noFill/>
+          <a:effectLst/>
         </p:spPr>
         <p:txBody>
-          <a:bodyPr/>
-          <a:lstStyle/>
+          <a:bodyPr vert="horz" wrap="square" lIns="36000" tIns="36000" rIns="36000" bIns="36000" rtlCol="0" anchor="ctr" anchorCtr="0">
+            <a:spAutoFit/>
+          </a:bodyPr>
+          <a:lstStyle>
+            <a:lvl1pPr marL="0" indent="0" algn="l" defTabSz="1218987" rtl="0" eaLnBrk="1" fontAlgn="base" latinLnBrk="0" hangingPunct="1">
+              <a:lnSpc>
+                <a:spcPct val="105000"/>
+              </a:lnSpc>
+              <a:spcBef>
+                <a:spcPct val="0"/>
+              </a:spcBef>
+              <a:spcAft>
+                <a:spcPct val="0"/>
+              </a:spcAft>
+              <a:buClr>
+                <a:srgbClr val="F2B254"/>
+              </a:buClr>
+              <a:buSzPct val="100000"/>
+              <a:buFont typeface="Wingdings" panose="05000000000000000000" pitchFamily="2" charset="2"/>
+              <a:buNone/>
+              <a:defRPr lang="en-US" sz="1800" b="1" kern="1200" dirty="0" smtClean="0">
+                <a:solidFill>
+                  <a:srgbClr val="F27A44"/>
+                </a:solidFill>
+                <a:effectLst/>
+                <a:latin typeface="+mn-lt"/>
+                <a:ea typeface="+mn-ea"/>
+                <a:cs typeface="+mn-cs"/>
+              </a:defRPr>
+            </a:lvl1pPr>
+            <a:lvl2pPr marL="609493" indent="-231606" algn="l" defTabSz="1218987" rtl="0" eaLnBrk="1" latinLnBrk="0" hangingPunct="1">
+              <a:lnSpc>
+                <a:spcPct val="105000"/>
+              </a:lnSpc>
+              <a:spcBef>
+                <a:spcPts val="600"/>
+              </a:spcBef>
+              <a:spcAft>
+                <a:spcPts val="600"/>
+              </a:spcAft>
+              <a:buClr>
+                <a:schemeClr val="accent1"/>
+              </a:buClr>
+              <a:buSzPct val="80000"/>
+              <a:buFont typeface="Wingdings" panose="05000000000000000000" pitchFamily="2" charset="2"/>
+              <a:buChar char="§"/>
+              <a:defRPr sz="3200" b="0" kern="1200">
+                <a:solidFill>
+                  <a:schemeClr val="tx1"/>
+                </a:solidFill>
+                <a:latin typeface="+mn-lt"/>
+                <a:ea typeface="+mn-ea"/>
+                <a:cs typeface="+mn-cs"/>
+              </a:defRPr>
+            </a:lvl2pPr>
+            <a:lvl3pPr marL="914240" indent="-231606" algn="l" defTabSz="1218987" rtl="0" eaLnBrk="1" latinLnBrk="0" hangingPunct="1">
+              <a:lnSpc>
+                <a:spcPct val="105000"/>
+              </a:lnSpc>
+              <a:spcBef>
+                <a:spcPts val="600"/>
+              </a:spcBef>
+              <a:spcAft>
+                <a:spcPts val="600"/>
+              </a:spcAft>
+              <a:buClr>
+                <a:srgbClr val="EF9A1D"/>
+              </a:buClr>
+              <a:buSzPct val="80000"/>
+              <a:buFont typeface="Wingdings" panose="05000000000000000000" pitchFamily="2" charset="2"/>
+              <a:buChar char="§"/>
+              <a:defRPr sz="3000" b="0" kern="1200">
+                <a:solidFill>
+                  <a:schemeClr val="tx1"/>
+                </a:solidFill>
+                <a:latin typeface="+mn-lt"/>
+                <a:ea typeface="+mn-ea"/>
+                <a:cs typeface="+mn-cs"/>
+              </a:defRPr>
+            </a:lvl3pPr>
+            <a:lvl4pPr marL="1218987" indent="-231606" algn="l" defTabSz="1218987" rtl="0" eaLnBrk="1" latinLnBrk="0" hangingPunct="1">
+              <a:lnSpc>
+                <a:spcPct val="105000"/>
+              </a:lnSpc>
+              <a:spcBef>
+                <a:spcPts val="600"/>
+              </a:spcBef>
+              <a:spcAft>
+                <a:spcPts val="600"/>
+              </a:spcAft>
+              <a:buClr>
+                <a:srgbClr val="ED9411"/>
+              </a:buClr>
+              <a:buSzPct val="80000"/>
+              <a:buFont typeface="Wingdings" panose="05000000000000000000" pitchFamily="2" charset="2"/>
+              <a:buChar char="§"/>
+              <a:defRPr sz="2800" b="0" kern="1200">
+                <a:solidFill>
+                  <a:schemeClr val="tx1"/>
+                </a:solidFill>
+                <a:latin typeface="+mn-lt"/>
+                <a:ea typeface="+mn-ea"/>
+                <a:cs typeface="+mn-cs"/>
+              </a:defRPr>
+            </a:lvl4pPr>
+            <a:lvl5pPr marL="1523733" indent="-231606" algn="l" defTabSz="1218987" rtl="0" eaLnBrk="1" latinLnBrk="0" hangingPunct="1">
+              <a:lnSpc>
+                <a:spcPct val="105000"/>
+              </a:lnSpc>
+              <a:spcBef>
+                <a:spcPts val="600"/>
+              </a:spcBef>
+              <a:spcAft>
+                <a:spcPts val="600"/>
+              </a:spcAft>
+              <a:buClr>
+                <a:srgbClr val="E28D10"/>
+              </a:buClr>
+              <a:buSzPct val="80000"/>
+              <a:buFont typeface="Wingdings" panose="05000000000000000000" pitchFamily="2" charset="2"/>
+              <a:buChar char="§"/>
+              <a:defRPr sz="2600" b="0" kern="1200">
+                <a:solidFill>
+                  <a:schemeClr val="tx1"/>
+                </a:solidFill>
+                <a:latin typeface="+mn-lt"/>
+                <a:ea typeface="+mn-ea"/>
+                <a:cs typeface="+mn-cs"/>
+              </a:defRPr>
+            </a:lvl5pPr>
+            <a:lvl6pPr marL="1828480" indent="-231606" algn="l" defTabSz="1218987" rtl="0" eaLnBrk="1" latinLnBrk="0" hangingPunct="1">
+              <a:lnSpc>
+                <a:spcPct val="90000"/>
+              </a:lnSpc>
+              <a:spcBef>
+                <a:spcPts val="800"/>
+              </a:spcBef>
+              <a:buClr>
+                <a:schemeClr val="accent1"/>
+              </a:buClr>
+              <a:buSzPct val="80000"/>
+              <a:buFont typeface="Arial" pitchFamily="34" charset="0"/>
+              <a:buChar char="•"/>
+              <a:defRPr sz="2000" kern="1200">
+                <a:solidFill>
+                  <a:schemeClr val="tx1"/>
+                </a:solidFill>
+                <a:latin typeface="+mn-lt"/>
+                <a:ea typeface="+mn-ea"/>
+                <a:cs typeface="+mn-cs"/>
+              </a:defRPr>
+            </a:lvl6pPr>
+            <a:lvl7pPr marL="2133227" indent="-231606" algn="l" defTabSz="1218987" rtl="0" eaLnBrk="1" latinLnBrk="0" hangingPunct="1">
+              <a:lnSpc>
+                <a:spcPct val="90000"/>
+              </a:lnSpc>
+              <a:spcBef>
+                <a:spcPts val="800"/>
+              </a:spcBef>
+              <a:buClr>
+                <a:schemeClr val="accent1"/>
+              </a:buClr>
+              <a:buSzPct val="80000"/>
+              <a:buFont typeface="Arial" pitchFamily="34" charset="0"/>
+              <a:buChar char="•"/>
+              <a:defRPr sz="2000" kern="1200">
+                <a:solidFill>
+                  <a:schemeClr val="tx1"/>
+                </a:solidFill>
+                <a:latin typeface="+mn-lt"/>
+                <a:ea typeface="+mn-ea"/>
+                <a:cs typeface="+mn-cs"/>
+              </a:defRPr>
+            </a:lvl7pPr>
+            <a:lvl8pPr marL="2437972" indent="-231606" algn="l" defTabSz="1218987" rtl="0" eaLnBrk="1" latinLnBrk="0" hangingPunct="1">
+              <a:lnSpc>
+                <a:spcPct val="90000"/>
+              </a:lnSpc>
+              <a:spcBef>
+                <a:spcPts val="800"/>
+              </a:spcBef>
+              <a:buClr>
+                <a:schemeClr val="accent1"/>
+              </a:buClr>
+              <a:buSzPct val="80000"/>
+              <a:buFont typeface="Arial" pitchFamily="34" charset="0"/>
+              <a:buChar char="•"/>
+              <a:defRPr sz="2000" kern="1200" baseline="0">
+                <a:solidFill>
+                  <a:schemeClr val="tx1"/>
+                </a:solidFill>
+                <a:latin typeface="+mn-lt"/>
+                <a:ea typeface="+mn-ea"/>
+                <a:cs typeface="+mn-cs"/>
+              </a:defRPr>
+            </a:lvl8pPr>
+            <a:lvl9pPr marL="2742720" indent="-231606" algn="l" defTabSz="1218987" rtl="0" eaLnBrk="1" latinLnBrk="0" hangingPunct="1">
+              <a:lnSpc>
+                <a:spcPct val="90000"/>
+              </a:lnSpc>
+              <a:spcBef>
+                <a:spcPts val="800"/>
+              </a:spcBef>
+              <a:buClr>
+                <a:schemeClr val="accent1"/>
+              </a:buClr>
+              <a:buSzPct val="80000"/>
+              <a:buFont typeface="Arial" pitchFamily="34" charset="0"/>
+              <a:buChar char="•"/>
+              <a:defRPr sz="2000" kern="1200" baseline="0">
+                <a:solidFill>
+                  <a:schemeClr val="tx1"/>
+                </a:solidFill>
+                <a:latin typeface="+mn-lt"/>
+                <a:ea typeface="+mn-ea"/>
+                <a:cs typeface="+mn-cs"/>
+              </a:defRPr>
+            </a:lvl9pPr>
+          </a:lstStyle>
           <a:p>
             <a:r>
               <a:rPr lang="en-US" dirty="0">
                 <a:hlinkClick r:id="rId3"/>
               </a:rPr>
-              <a:t>https://it-kariera.mon.bg/</a:t>
-            </a:r>
-            <a:r>
-              <a:rPr lang="en-US">
-                <a:hlinkClick r:id="rId3"/>
-              </a:rPr>
-              <a:t>e-learning/</a:t>
-            </a:r>
-            <a:endParaRPr lang="en-US" dirty="0"/>
+              <a:t>https://github.com/BG-IT-Edu/School-Programming/tree/main/Courses/Applied-Programmer/Programming-Fundamentals</a:t>
+            </a:r>
+            <a:endParaRPr lang="en-GB" dirty="0"/>
           </a:p>
         </p:txBody>
       </p:sp>

</xml_diff>

<commit_message>
Added animations to presentations' slides
</commit_message>
<xml_diff>
--- a/Courses/Applied-Programmer/Programming-Fundamentals/01-Системи-за-контрол-на-версиите/01.Системи-за-контрол-на-версиите.pptx
+++ b/Courses/Applied-Programmer/Programming-Fundamentals/01-Системи-за-контрол-на-версиите/01.Системи-за-контрол-на-версиите.pptx
@@ -347,7 +347,7 @@
             <a:fld id="{FE5B4EDC-59C0-49C7-8ADA-5A781B329E02}" type="datetimeFigureOut">
               <a:rPr lang="en-US"/>
               <a:pPr/>
-              <a:t>19-Nov-20</a:t>
+              <a:t>21-Nov-20</a:t>
             </a:fld>
             <a:endParaRPr dirty="0"/>
           </a:p>
@@ -645,7 +645,7 @@
             <a:fld id="{F2D8D46A-B586-417D-BFBD-8C8FE0AAF762}" type="datetimeFigureOut">
               <a:rPr lang="en-US" smtClean="0"/>
               <a:pPr/>
-              <a:t>19-Nov-20</a:t>
+              <a:t>21-Nov-20</a:t>
             </a:fld>
             <a:endParaRPr lang="en-US" dirty="0"/>
           </a:p>
@@ -11428,6 +11428,183 @@
   <p:clrMapOvr>
     <a:masterClrMapping/>
   </p:clrMapOvr>
+  <p:timing>
+    <p:tnLst>
+      <p:par>
+        <p:cTn id="1" dur="indefinite" restart="never" nodeType="tmRoot">
+          <p:childTnLst>
+            <p:seq concurrent="1" nextAc="seek">
+              <p:cTn id="2" dur="indefinite" nodeType="mainSeq">
+                <p:childTnLst>
+                  <p:par>
+                    <p:cTn id="3" fill="hold">
+                      <p:stCondLst>
+                        <p:cond delay="indefinite"/>
+                      </p:stCondLst>
+                      <p:childTnLst>
+                        <p:par>
+                          <p:cTn id="4" fill="hold">
+                            <p:stCondLst>
+                              <p:cond delay="0"/>
+                            </p:stCondLst>
+                            <p:childTnLst>
+                              <p:par>
+                                <p:cTn id="5" presetID="1" presetClass="entr" presetSubtype="0" fill="hold" nodeType="clickEffect">
+                                  <p:stCondLst>
+                                    <p:cond delay="0"/>
+                                  </p:stCondLst>
+                                  <p:childTnLst>
+                                    <p:set>
+                                      <p:cBhvr>
+                                        <p:cTn id="6" dur="1" fill="hold">
+                                          <p:stCondLst>
+                                            <p:cond delay="0"/>
+                                          </p:stCondLst>
+                                        </p:cTn>
+                                        <p:tgtEl>
+                                          <p:spTgt spid="5">
+                                            <p:txEl>
+                                              <p:pRg st="1" end="1"/>
+                                            </p:txEl>
+                                          </p:spTgt>
+                                        </p:tgtEl>
+                                        <p:attrNameLst>
+                                          <p:attrName>style.visibility</p:attrName>
+                                        </p:attrNameLst>
+                                      </p:cBhvr>
+                                      <p:to>
+                                        <p:strVal val="visible"/>
+                                      </p:to>
+                                    </p:set>
+                                  </p:childTnLst>
+                                </p:cTn>
+                              </p:par>
+                            </p:childTnLst>
+                          </p:cTn>
+                        </p:par>
+                      </p:childTnLst>
+                    </p:cTn>
+                  </p:par>
+                  <p:par>
+                    <p:cTn id="7" fill="hold">
+                      <p:stCondLst>
+                        <p:cond delay="indefinite"/>
+                      </p:stCondLst>
+                      <p:childTnLst>
+                        <p:par>
+                          <p:cTn id="8" fill="hold">
+                            <p:stCondLst>
+                              <p:cond delay="0"/>
+                            </p:stCondLst>
+                            <p:childTnLst>
+                              <p:par>
+                                <p:cTn id="9" presetID="1" presetClass="entr" presetSubtype="0" fill="hold" nodeType="clickEffect">
+                                  <p:stCondLst>
+                                    <p:cond delay="0"/>
+                                  </p:stCondLst>
+                                  <p:childTnLst>
+                                    <p:set>
+                                      <p:cBhvr>
+                                        <p:cTn id="10" dur="1" fill="hold">
+                                          <p:stCondLst>
+                                            <p:cond delay="0"/>
+                                          </p:stCondLst>
+                                        </p:cTn>
+                                        <p:tgtEl>
+                                          <p:spTgt spid="5">
+                                            <p:txEl>
+                                              <p:pRg st="2" end="2"/>
+                                            </p:txEl>
+                                          </p:spTgt>
+                                        </p:tgtEl>
+                                        <p:attrNameLst>
+                                          <p:attrName>style.visibility</p:attrName>
+                                        </p:attrNameLst>
+                                      </p:cBhvr>
+                                      <p:to>
+                                        <p:strVal val="visible"/>
+                                      </p:to>
+                                    </p:set>
+                                  </p:childTnLst>
+                                </p:cTn>
+                              </p:par>
+                            </p:childTnLst>
+                          </p:cTn>
+                        </p:par>
+                      </p:childTnLst>
+                    </p:cTn>
+                  </p:par>
+                  <p:par>
+                    <p:cTn id="11" fill="hold">
+                      <p:stCondLst>
+                        <p:cond delay="indefinite"/>
+                      </p:stCondLst>
+                      <p:childTnLst>
+                        <p:par>
+                          <p:cTn id="12" fill="hold">
+                            <p:stCondLst>
+                              <p:cond delay="0"/>
+                            </p:stCondLst>
+                            <p:childTnLst>
+                              <p:par>
+                                <p:cTn id="13" presetID="1" presetClass="entr" presetSubtype="0" fill="hold" nodeType="clickEffect">
+                                  <p:stCondLst>
+                                    <p:cond delay="0"/>
+                                  </p:stCondLst>
+                                  <p:childTnLst>
+                                    <p:set>
+                                      <p:cBhvr>
+                                        <p:cTn id="14" dur="1" fill="hold">
+                                          <p:stCondLst>
+                                            <p:cond delay="0"/>
+                                          </p:stCondLst>
+                                        </p:cTn>
+                                        <p:tgtEl>
+                                          <p:spTgt spid="5">
+                                            <p:txEl>
+                                              <p:pRg st="3" end="3"/>
+                                            </p:txEl>
+                                          </p:spTgt>
+                                        </p:tgtEl>
+                                        <p:attrNameLst>
+                                          <p:attrName>style.visibility</p:attrName>
+                                        </p:attrNameLst>
+                                      </p:cBhvr>
+                                      <p:to>
+                                        <p:strVal val="visible"/>
+                                      </p:to>
+                                    </p:set>
+                                  </p:childTnLst>
+                                </p:cTn>
+                              </p:par>
+                            </p:childTnLst>
+                          </p:cTn>
+                        </p:par>
+                      </p:childTnLst>
+                    </p:cTn>
+                  </p:par>
+                </p:childTnLst>
+              </p:cTn>
+              <p:prevCondLst>
+                <p:cond evt="onPrev" delay="0">
+                  <p:tgtEl>
+                    <p:sldTgt/>
+                  </p:tgtEl>
+                </p:cond>
+              </p:prevCondLst>
+              <p:nextCondLst>
+                <p:cond evt="onNext" delay="0">
+                  <p:tgtEl>
+                    <p:sldTgt/>
+                  </p:tgtEl>
+                </p:cond>
+              </p:nextCondLst>
+            </p:seq>
+          </p:childTnLst>
+        </p:cTn>
+      </p:par>
+    </p:tnLst>
+  </p:timing>
 </p:sld>
 </file>
 
@@ -12476,6 +12653,183 @@
   <p:clrMapOvr>
     <a:masterClrMapping/>
   </p:clrMapOvr>
+  <p:timing>
+    <p:tnLst>
+      <p:par>
+        <p:cTn id="1" dur="indefinite" restart="never" nodeType="tmRoot">
+          <p:childTnLst>
+            <p:seq concurrent="1" nextAc="seek">
+              <p:cTn id="2" dur="indefinite" nodeType="mainSeq">
+                <p:childTnLst>
+                  <p:par>
+                    <p:cTn id="3" fill="hold">
+                      <p:stCondLst>
+                        <p:cond delay="indefinite"/>
+                      </p:stCondLst>
+                      <p:childTnLst>
+                        <p:par>
+                          <p:cTn id="4" fill="hold">
+                            <p:stCondLst>
+                              <p:cond delay="0"/>
+                            </p:stCondLst>
+                            <p:childTnLst>
+                              <p:par>
+                                <p:cTn id="5" presetID="1" presetClass="entr" presetSubtype="0" fill="hold" nodeType="clickEffect">
+                                  <p:stCondLst>
+                                    <p:cond delay="0"/>
+                                  </p:stCondLst>
+                                  <p:childTnLst>
+                                    <p:set>
+                                      <p:cBhvr>
+                                        <p:cTn id="6" dur="1" fill="hold">
+                                          <p:stCondLst>
+                                            <p:cond delay="0"/>
+                                          </p:stCondLst>
+                                        </p:cTn>
+                                        <p:tgtEl>
+                                          <p:spTgt spid="7">
+                                            <p:txEl>
+                                              <p:pRg st="1" end="1"/>
+                                            </p:txEl>
+                                          </p:spTgt>
+                                        </p:tgtEl>
+                                        <p:attrNameLst>
+                                          <p:attrName>style.visibility</p:attrName>
+                                        </p:attrNameLst>
+                                      </p:cBhvr>
+                                      <p:to>
+                                        <p:strVal val="visible"/>
+                                      </p:to>
+                                    </p:set>
+                                  </p:childTnLst>
+                                </p:cTn>
+                              </p:par>
+                            </p:childTnLst>
+                          </p:cTn>
+                        </p:par>
+                      </p:childTnLst>
+                    </p:cTn>
+                  </p:par>
+                  <p:par>
+                    <p:cTn id="7" fill="hold">
+                      <p:stCondLst>
+                        <p:cond delay="indefinite"/>
+                      </p:stCondLst>
+                      <p:childTnLst>
+                        <p:par>
+                          <p:cTn id="8" fill="hold">
+                            <p:stCondLst>
+                              <p:cond delay="0"/>
+                            </p:stCondLst>
+                            <p:childTnLst>
+                              <p:par>
+                                <p:cTn id="9" presetID="1" presetClass="entr" presetSubtype="0" fill="hold" nodeType="clickEffect">
+                                  <p:stCondLst>
+                                    <p:cond delay="0"/>
+                                  </p:stCondLst>
+                                  <p:childTnLst>
+                                    <p:set>
+                                      <p:cBhvr>
+                                        <p:cTn id="10" dur="1" fill="hold">
+                                          <p:stCondLst>
+                                            <p:cond delay="0"/>
+                                          </p:stCondLst>
+                                        </p:cTn>
+                                        <p:tgtEl>
+                                          <p:spTgt spid="7">
+                                            <p:txEl>
+                                              <p:pRg st="2" end="2"/>
+                                            </p:txEl>
+                                          </p:spTgt>
+                                        </p:tgtEl>
+                                        <p:attrNameLst>
+                                          <p:attrName>style.visibility</p:attrName>
+                                        </p:attrNameLst>
+                                      </p:cBhvr>
+                                      <p:to>
+                                        <p:strVal val="visible"/>
+                                      </p:to>
+                                    </p:set>
+                                  </p:childTnLst>
+                                </p:cTn>
+                              </p:par>
+                            </p:childTnLst>
+                          </p:cTn>
+                        </p:par>
+                      </p:childTnLst>
+                    </p:cTn>
+                  </p:par>
+                  <p:par>
+                    <p:cTn id="11" fill="hold">
+                      <p:stCondLst>
+                        <p:cond delay="indefinite"/>
+                      </p:stCondLst>
+                      <p:childTnLst>
+                        <p:par>
+                          <p:cTn id="12" fill="hold">
+                            <p:stCondLst>
+                              <p:cond delay="0"/>
+                            </p:stCondLst>
+                            <p:childTnLst>
+                              <p:par>
+                                <p:cTn id="13" presetID="1" presetClass="entr" presetSubtype="0" fill="hold" nodeType="clickEffect">
+                                  <p:stCondLst>
+                                    <p:cond delay="0"/>
+                                  </p:stCondLst>
+                                  <p:childTnLst>
+                                    <p:set>
+                                      <p:cBhvr>
+                                        <p:cTn id="14" dur="1" fill="hold">
+                                          <p:stCondLst>
+                                            <p:cond delay="0"/>
+                                          </p:stCondLst>
+                                        </p:cTn>
+                                        <p:tgtEl>
+                                          <p:spTgt spid="7">
+                                            <p:txEl>
+                                              <p:pRg st="3" end="3"/>
+                                            </p:txEl>
+                                          </p:spTgt>
+                                        </p:tgtEl>
+                                        <p:attrNameLst>
+                                          <p:attrName>style.visibility</p:attrName>
+                                        </p:attrNameLst>
+                                      </p:cBhvr>
+                                      <p:to>
+                                        <p:strVal val="visible"/>
+                                      </p:to>
+                                    </p:set>
+                                  </p:childTnLst>
+                                </p:cTn>
+                              </p:par>
+                            </p:childTnLst>
+                          </p:cTn>
+                        </p:par>
+                      </p:childTnLst>
+                    </p:cTn>
+                  </p:par>
+                </p:childTnLst>
+              </p:cTn>
+              <p:prevCondLst>
+                <p:cond evt="onPrev" delay="0">
+                  <p:tgtEl>
+                    <p:sldTgt/>
+                  </p:tgtEl>
+                </p:cond>
+              </p:prevCondLst>
+              <p:nextCondLst>
+                <p:cond evt="onNext" delay="0">
+                  <p:tgtEl>
+                    <p:sldTgt/>
+                  </p:tgtEl>
+                </p:cond>
+              </p:nextCondLst>
+            </p:seq>
+          </p:childTnLst>
+        </p:cTn>
+      </p:par>
+    </p:tnLst>
+  </p:timing>
 </p:sld>
 </file>
 
@@ -12849,15 +13203,33 @@
                                   </p:childTnLst>
                                 </p:cTn>
                               </p:par>
+                            </p:childTnLst>
+                          </p:cTn>
+                        </p:par>
+                      </p:childTnLst>
+                    </p:cTn>
+                  </p:par>
+                  <p:par>
+                    <p:cTn id="7" fill="hold">
+                      <p:stCondLst>
+                        <p:cond delay="indefinite"/>
+                      </p:stCondLst>
+                      <p:childTnLst>
+                        <p:par>
+                          <p:cTn id="8" fill="hold">
+                            <p:stCondLst>
+                              <p:cond delay="0"/>
+                            </p:stCondLst>
+                            <p:childTnLst>
                               <p:par>
-                                <p:cTn id="7" presetID="1" presetClass="entr" presetSubtype="0" fill="hold" nodeType="withEffect">
+                                <p:cTn id="9" presetID="1" presetClass="entr" presetSubtype="0" fill="hold" nodeType="clickEffect">
                                   <p:stCondLst>
                                     <p:cond delay="0"/>
                                   </p:stCondLst>
                                   <p:childTnLst>
                                     <p:set>
                                       <p:cBhvr>
-                                        <p:cTn id="8" dur="1" fill="hold">
+                                        <p:cTn id="10" dur="1" fill="hold">
                                           <p:stCondLst>
                                             <p:cond delay="0"/>
                                           </p:stCondLst>
@@ -12887,50 +13259,19 @@
                     </p:cTn>
                   </p:par>
                   <p:par>
-                    <p:cTn id="9" fill="hold">
+                    <p:cTn id="11" fill="hold">
                       <p:stCondLst>
                         <p:cond delay="indefinite"/>
                       </p:stCondLst>
                       <p:childTnLst>
                         <p:par>
-                          <p:cTn id="10" fill="hold">
+                          <p:cTn id="12" fill="hold">
                             <p:stCondLst>
                               <p:cond delay="0"/>
                             </p:stCondLst>
                             <p:childTnLst>
                               <p:par>
-                                <p:cTn id="11" presetID="1" presetClass="entr" presetSubtype="0" fill="hold" nodeType="clickEffect">
-                                  <p:stCondLst>
-                                    <p:cond delay="0"/>
-                                  </p:stCondLst>
-                                  <p:childTnLst>
-                                    <p:set>
-                                      <p:cBhvr>
-                                        <p:cTn id="12" dur="1" fill="hold">
-                                          <p:stCondLst>
-                                            <p:cond delay="0"/>
-                                          </p:stCondLst>
-                                        </p:cTn>
-                                        <p:tgtEl>
-                                          <p:spTgt spid="578564">
-                                            <p:txEl>
-                                              <p:pRg st="3" end="3"/>
-                                            </p:txEl>
-                                          </p:spTgt>
-                                        </p:tgtEl>
-                                        <p:attrNameLst>
-                                          <p:attrName>style.visibility</p:attrName>
-                                        </p:attrNameLst>
-                                      </p:cBhvr>
-                                      <p:to>
-                                        <p:strVal val="visible"/>
-                                      </p:to>
-                                    </p:set>
-                                  </p:childTnLst>
-                                </p:cTn>
-                              </p:par>
-                              <p:par>
-                                <p:cTn id="13" presetID="1" presetClass="entr" presetSubtype="0" fill="hold" nodeType="withEffect">
+                                <p:cTn id="13" presetID="1" presetClass="entr" presetSubtype="0" fill="hold" nodeType="clickEffect">
                                   <p:stCondLst>
                                     <p:cond delay="0"/>
                                   </p:stCondLst>
@@ -12945,7 +13286,7 @@
                                         <p:tgtEl>
                                           <p:spTgt spid="578564">
                                             <p:txEl>
-                                              <p:pRg st="4" end="4"/>
+                                              <p:pRg st="3" end="3"/>
                                             </p:txEl>
                                           </p:spTgt>
                                         </p:tgtEl>
@@ -12994,6 +13335,55 @@
                                         <p:tgtEl>
                                           <p:spTgt spid="578564">
                                             <p:txEl>
+                                              <p:pRg st="4" end="4"/>
+                                            </p:txEl>
+                                          </p:spTgt>
+                                        </p:tgtEl>
+                                        <p:attrNameLst>
+                                          <p:attrName>style.visibility</p:attrName>
+                                        </p:attrNameLst>
+                                      </p:cBhvr>
+                                      <p:to>
+                                        <p:strVal val="visible"/>
+                                      </p:to>
+                                    </p:set>
+                                  </p:childTnLst>
+                                </p:cTn>
+                              </p:par>
+                            </p:childTnLst>
+                          </p:cTn>
+                        </p:par>
+                      </p:childTnLst>
+                    </p:cTn>
+                  </p:par>
+                  <p:par>
+                    <p:cTn id="19" fill="hold">
+                      <p:stCondLst>
+                        <p:cond delay="indefinite"/>
+                      </p:stCondLst>
+                      <p:childTnLst>
+                        <p:par>
+                          <p:cTn id="20" fill="hold">
+                            <p:stCondLst>
+                              <p:cond delay="0"/>
+                            </p:stCondLst>
+                            <p:childTnLst>
+                              <p:par>
+                                <p:cTn id="21" presetID="1" presetClass="entr" presetSubtype="0" fill="hold" nodeType="clickEffect">
+                                  <p:stCondLst>
+                                    <p:cond delay="0"/>
+                                  </p:stCondLst>
+                                  <p:childTnLst>
+                                    <p:set>
+                                      <p:cBhvr>
+                                        <p:cTn id="22" dur="1" fill="hold">
+                                          <p:stCondLst>
+                                            <p:cond delay="0"/>
+                                          </p:stCondLst>
+                                        </p:cTn>
+                                        <p:tgtEl>
+                                          <p:spTgt spid="578564">
+                                            <p:txEl>
                                               <p:pRg st="5" end="5"/>
                                             </p:txEl>
                                           </p:spTgt>
@@ -13009,15 +13399,33 @@
                                   </p:childTnLst>
                                 </p:cTn>
                               </p:par>
+                            </p:childTnLst>
+                          </p:cTn>
+                        </p:par>
+                      </p:childTnLst>
+                    </p:cTn>
+                  </p:par>
+                  <p:par>
+                    <p:cTn id="23" fill="hold">
+                      <p:stCondLst>
+                        <p:cond delay="indefinite"/>
+                      </p:stCondLst>
+                      <p:childTnLst>
+                        <p:par>
+                          <p:cTn id="24" fill="hold">
+                            <p:stCondLst>
+                              <p:cond delay="0"/>
+                            </p:stCondLst>
+                            <p:childTnLst>
                               <p:par>
-                                <p:cTn id="19" presetID="1" presetClass="entr" presetSubtype="0" fill="hold" nodeType="withEffect">
+                                <p:cTn id="25" presetID="1" presetClass="entr" presetSubtype="0" fill="hold" nodeType="clickEffect">
                                   <p:stCondLst>
                                     <p:cond delay="0"/>
                                   </p:stCondLst>
                                   <p:childTnLst>
                                     <p:set>
                                       <p:cBhvr>
-                                        <p:cTn id="20" dur="1" fill="hold">
+                                        <p:cTn id="26" dur="1" fill="hold">
                                           <p:stCondLst>
                                             <p:cond delay="0"/>
                                           </p:stCondLst>
@@ -15854,6 +16262,9 @@
                     <p:cTn id="3" fill="hold">
                       <p:stCondLst>
                         <p:cond delay="indefinite"/>
+                        <p:cond evt="onBegin" delay="0">
+                          <p:tn val="2"/>
+                        </p:cond>
                       </p:stCondLst>
                       <p:childTnLst>
                         <p:par>
@@ -15863,7 +16274,7 @@
                             </p:stCondLst>
                             <p:childTnLst>
                               <p:par>
-                                <p:cTn id="5" presetID="2" presetClass="entr" presetSubtype="4" fill="hold" grpId="0" nodeType="clickEffect">
+                                <p:cTn id="5" presetID="2" presetClass="entr" presetSubtype="4" fill="hold" grpId="0" nodeType="withEffect">
                                   <p:stCondLst>
                                     <p:cond delay="0"/>
                                   </p:stCondLst>
@@ -15876,7 +16287,7 @@
                                           </p:stCondLst>
                                         </p:cTn>
                                         <p:tgtEl>
-                                          <p:spTgt spid="684038"/>
+                                          <p:spTgt spid="684047"/>
                                         </p:tgtEl>
                                         <p:attrNameLst>
                                           <p:attrName>style.visibility</p:attrName>
@@ -15890,7 +16301,7 @@
                                       <p:cBhvr additive="base">
                                         <p:cTn id="7" dur="500" fill="hold"/>
                                         <p:tgtEl>
-                                          <p:spTgt spid="684038"/>
+                                          <p:spTgt spid="684047"/>
                                         </p:tgtEl>
                                         <p:attrNameLst>
                                           <p:attrName>ppt_x</p:attrName>
@@ -15913,7 +16324,7 @@
                                       <p:cBhvr additive="base">
                                         <p:cTn id="8" dur="500" fill="hold"/>
                                         <p:tgtEl>
-                                          <p:spTgt spid="684038"/>
+                                          <p:spTgt spid="684047"/>
                                         </p:tgtEl>
                                         <p:attrNameLst>
                                           <p:attrName>ppt_y</p:attrName>
@@ -15935,21 +16346,39 @@
                                   </p:childTnLst>
                                 </p:cTn>
                               </p:par>
+                            </p:childTnLst>
+                          </p:cTn>
+                        </p:par>
+                      </p:childTnLst>
+                    </p:cTn>
+                  </p:par>
+                  <p:par>
+                    <p:cTn id="9" fill="hold">
+                      <p:stCondLst>
+                        <p:cond delay="indefinite"/>
+                      </p:stCondLst>
+                      <p:childTnLst>
+                        <p:par>
+                          <p:cTn id="10" fill="hold">
+                            <p:stCondLst>
+                              <p:cond delay="0"/>
+                            </p:stCondLst>
+                            <p:childTnLst>
                               <p:par>
-                                <p:cTn id="9" presetID="2" presetClass="entr" presetSubtype="4" fill="hold" grpId="0" nodeType="withEffect">
+                                <p:cTn id="11" presetID="1" presetClass="entr" presetSubtype="0" fill="hold" grpId="0" nodeType="clickEffect">
                                   <p:stCondLst>
                                     <p:cond delay="0"/>
                                   </p:stCondLst>
                                   <p:childTnLst>
                                     <p:set>
                                       <p:cBhvr>
-                                        <p:cTn id="10" dur="1" fill="hold">
+                                        <p:cTn id="12" dur="1" fill="hold">
                                           <p:stCondLst>
                                             <p:cond delay="0"/>
                                           </p:stCondLst>
                                         </p:cTn>
                                         <p:tgtEl>
-                                          <p:spTgt spid="684039"/>
+                                          <p:spTgt spid="9229"/>
                                         </p:tgtEl>
                                         <p:attrNameLst>
                                           <p:attrName>style.visibility</p:attrName>
@@ -15959,52 +16388,6 @@
                                         <p:strVal val="visible"/>
                                       </p:to>
                                     </p:set>
-                                    <p:anim calcmode="lin" valueType="num">
-                                      <p:cBhvr additive="base">
-                                        <p:cTn id="11" dur="500" fill="hold"/>
-                                        <p:tgtEl>
-                                          <p:spTgt spid="684039"/>
-                                        </p:tgtEl>
-                                        <p:attrNameLst>
-                                          <p:attrName>ppt_x</p:attrName>
-                                        </p:attrNameLst>
-                                      </p:cBhvr>
-                                      <p:tavLst>
-                                        <p:tav tm="0">
-                                          <p:val>
-                                            <p:strVal val="#ppt_x"/>
-                                          </p:val>
-                                        </p:tav>
-                                        <p:tav tm="100000">
-                                          <p:val>
-                                            <p:strVal val="#ppt_x"/>
-                                          </p:val>
-                                        </p:tav>
-                                      </p:tavLst>
-                                    </p:anim>
-                                    <p:anim calcmode="lin" valueType="num">
-                                      <p:cBhvr additive="base">
-                                        <p:cTn id="12" dur="500" fill="hold"/>
-                                        <p:tgtEl>
-                                          <p:spTgt spid="684039"/>
-                                        </p:tgtEl>
-                                        <p:attrNameLst>
-                                          <p:attrName>ppt_y</p:attrName>
-                                        </p:attrNameLst>
-                                      </p:cBhvr>
-                                      <p:tavLst>
-                                        <p:tav tm="0">
-                                          <p:val>
-                                            <p:strVal val="1+#ppt_h/2"/>
-                                          </p:val>
-                                        </p:tav>
-                                        <p:tav tm="100000">
-                                          <p:val>
-                                            <p:strVal val="#ppt_y"/>
-                                          </p:val>
-                                        </p:tav>
-                                      </p:tavLst>
-                                    </p:anim>
                                   </p:childTnLst>
                                 </p:cTn>
                               </p:par>
@@ -16081,15 +16464,60 @@
                                   </p:childTnLst>
                                 </p:cTn>
                               </p:par>
+                            </p:childTnLst>
+                          </p:cTn>
+                        </p:par>
+                      </p:childTnLst>
+                    </p:cTn>
+                  </p:par>
+                  <p:par>
+                    <p:cTn id="17" fill="hold">
+                      <p:stCondLst>
+                        <p:cond delay="indefinite"/>
+                      </p:stCondLst>
+                      <p:childTnLst>
+                        <p:par>
+                          <p:cTn id="18" fill="hold">
+                            <p:stCondLst>
+                              <p:cond delay="0"/>
+                            </p:stCondLst>
+                            <p:childTnLst>
                               <p:par>
-                                <p:cTn id="17" presetID="2" presetClass="entr" presetSubtype="4" fill="hold" grpId="0" nodeType="withEffect">
+                                <p:cTn id="19" presetID="1" presetClass="entr" presetSubtype="0" fill="hold" grpId="0" nodeType="clickEffect">
                                   <p:stCondLst>
                                     <p:cond delay="0"/>
                                   </p:stCondLst>
                                   <p:childTnLst>
                                     <p:set>
                                       <p:cBhvr>
-                                        <p:cTn id="18" dur="1" fill="hold">
+                                        <p:cTn id="20" dur="1" fill="hold">
+                                          <p:stCondLst>
+                                            <p:cond delay="0"/>
+                                          </p:stCondLst>
+                                        </p:cTn>
+                                        <p:tgtEl>
+                                          <p:spTgt spid="9226"/>
+                                        </p:tgtEl>
+                                        <p:attrNameLst>
+                                          <p:attrName>style.visibility</p:attrName>
+                                        </p:attrNameLst>
+                                      </p:cBhvr>
+                                      <p:to>
+                                        <p:strVal val="visible"/>
+                                      </p:to>
+                                    </p:set>
+                                  </p:childTnLst>
+                                </p:cTn>
+                              </p:par>
+                              <p:par>
+                                <p:cTn id="21" presetID="2" presetClass="entr" presetSubtype="4" fill="hold" grpId="0" nodeType="withEffect">
+                                  <p:stCondLst>
+                                    <p:cond delay="0"/>
+                                  </p:stCondLst>
+                                  <p:childTnLst>
+                                    <p:set>
+                                      <p:cBhvr>
+                                        <p:cTn id="22" dur="1" fill="hold">
                                           <p:stCondLst>
                                             <p:cond delay="0"/>
                                           </p:stCondLst>
@@ -16107,7 +16535,7 @@
                                     </p:set>
                                     <p:anim calcmode="lin" valueType="num">
                                       <p:cBhvr additive="base">
-                                        <p:cTn id="19" dur="500" fill="hold"/>
+                                        <p:cTn id="23" dur="500" fill="hold"/>
                                         <p:tgtEl>
                                           <p:spTgt spid="684036"/>
                                         </p:tgtEl>
@@ -16130,7 +16558,7 @@
                                     </p:anim>
                                     <p:anim calcmode="lin" valueType="num">
                                       <p:cBhvr additive="base">
-                                        <p:cTn id="20" dur="500" fill="hold"/>
+                                        <p:cTn id="24" dur="500" fill="hold"/>
                                         <p:tgtEl>
                                           <p:spTgt spid="684036"/>
                                         </p:tgtEl>
@@ -16154,15 +16582,60 @@
                                   </p:childTnLst>
                                 </p:cTn>
                               </p:par>
+                            </p:childTnLst>
+                          </p:cTn>
+                        </p:par>
+                      </p:childTnLst>
+                    </p:cTn>
+                  </p:par>
+                  <p:par>
+                    <p:cTn id="25" fill="hold">
+                      <p:stCondLst>
+                        <p:cond delay="indefinite"/>
+                      </p:stCondLst>
+                      <p:childTnLst>
+                        <p:par>
+                          <p:cTn id="26" fill="hold">
+                            <p:stCondLst>
+                              <p:cond delay="0"/>
+                            </p:stCondLst>
+                            <p:childTnLst>
                               <p:par>
-                                <p:cTn id="21" presetID="2" presetClass="entr" presetSubtype="4" fill="hold" grpId="0" nodeType="withEffect">
+                                <p:cTn id="27" presetID="1" presetClass="entr" presetSubtype="0" fill="hold" grpId="0" nodeType="clickEffect">
                                   <p:stCondLst>
                                     <p:cond delay="0"/>
                                   </p:stCondLst>
                                   <p:childTnLst>
                                     <p:set>
                                       <p:cBhvr>
-                                        <p:cTn id="22" dur="1" fill="hold">
+                                        <p:cTn id="28" dur="1" fill="hold">
+                                          <p:stCondLst>
+                                            <p:cond delay="0"/>
+                                          </p:stCondLst>
+                                        </p:cTn>
+                                        <p:tgtEl>
+                                          <p:spTgt spid="9225"/>
+                                        </p:tgtEl>
+                                        <p:attrNameLst>
+                                          <p:attrName>style.visibility</p:attrName>
+                                        </p:attrNameLst>
+                                      </p:cBhvr>
+                                      <p:to>
+                                        <p:strVal val="visible"/>
+                                      </p:to>
+                                    </p:set>
+                                  </p:childTnLst>
+                                </p:cTn>
+                              </p:par>
+                              <p:par>
+                                <p:cTn id="29" presetID="2" presetClass="entr" presetSubtype="4" fill="hold" grpId="0" nodeType="withEffect">
+                                  <p:stCondLst>
+                                    <p:cond delay="0"/>
+                                  </p:stCondLst>
+                                  <p:childTnLst>
+                                    <p:set>
+                                      <p:cBhvr>
+                                        <p:cTn id="30" dur="1" fill="hold">
                                           <p:stCondLst>
                                             <p:cond delay="0"/>
                                           </p:stCondLst>
@@ -16180,7 +16653,7 @@
                                     </p:set>
                                     <p:anim calcmode="lin" valueType="num">
                                       <p:cBhvr additive="base">
-                                        <p:cTn id="23" dur="500" fill="hold"/>
+                                        <p:cTn id="31" dur="500" fill="hold"/>
                                         <p:tgtEl>
                                           <p:spTgt spid="684035"/>
                                         </p:tgtEl>
@@ -16203,7 +16676,7 @@
                                     </p:anim>
                                     <p:anim calcmode="lin" valueType="num">
                                       <p:cBhvr additive="base">
-                                        <p:cTn id="24" dur="500" fill="hold"/>
+                                        <p:cTn id="32" dur="500" fill="hold"/>
                                         <p:tgtEl>
                                           <p:spTgt spid="684035"/>
                                         </p:tgtEl>
@@ -16227,15 +16700,60 @@
                                   </p:childTnLst>
                                 </p:cTn>
                               </p:par>
+                            </p:childTnLst>
+                          </p:cTn>
+                        </p:par>
+                      </p:childTnLst>
+                    </p:cTn>
+                  </p:par>
+                  <p:par>
+                    <p:cTn id="33" fill="hold">
+                      <p:stCondLst>
+                        <p:cond delay="indefinite"/>
+                      </p:stCondLst>
+                      <p:childTnLst>
+                        <p:par>
+                          <p:cTn id="34" fill="hold">
+                            <p:stCondLst>
+                              <p:cond delay="0"/>
+                            </p:stCondLst>
+                            <p:childTnLst>
                               <p:par>
-                                <p:cTn id="25" presetID="2" presetClass="entr" presetSubtype="4" fill="hold" grpId="0" nodeType="withEffect">
+                                <p:cTn id="35" presetID="1" presetClass="entr" presetSubtype="0" fill="hold" grpId="0" nodeType="clickEffect">
                                   <p:stCondLst>
                                     <p:cond delay="0"/>
                                   </p:stCondLst>
                                   <p:childTnLst>
                                     <p:set>
                                       <p:cBhvr>
-                                        <p:cTn id="26" dur="1" fill="hold">
+                                        <p:cTn id="36" dur="1" fill="hold">
+                                          <p:stCondLst>
+                                            <p:cond delay="0"/>
+                                          </p:stCondLst>
+                                        </p:cTn>
+                                        <p:tgtEl>
+                                          <p:spTgt spid="9227"/>
+                                        </p:tgtEl>
+                                        <p:attrNameLst>
+                                          <p:attrName>style.visibility</p:attrName>
+                                        </p:attrNameLst>
+                                      </p:cBhvr>
+                                      <p:to>
+                                        <p:strVal val="visible"/>
+                                      </p:to>
+                                    </p:set>
+                                  </p:childTnLst>
+                                </p:cTn>
+                              </p:par>
+                              <p:par>
+                                <p:cTn id="37" presetID="2" presetClass="entr" presetSubtype="4" fill="hold" grpId="0" nodeType="withEffect">
+                                  <p:stCondLst>
+                                    <p:cond delay="0"/>
+                                  </p:stCondLst>
+                                  <p:childTnLst>
+                                    <p:set>
+                                      <p:cBhvr>
+                                        <p:cTn id="38" dur="1" fill="hold">
                                           <p:stCondLst>
                                             <p:cond delay="0"/>
                                           </p:stCondLst>
@@ -16253,7 +16771,7 @@
                                     </p:set>
                                     <p:anim calcmode="lin" valueType="num">
                                       <p:cBhvr additive="base">
-                                        <p:cTn id="27" dur="500" fill="hold"/>
+                                        <p:cTn id="39" dur="500" fill="hold"/>
                                         <p:tgtEl>
                                           <p:spTgt spid="684037"/>
                                         </p:tgtEl>
@@ -16276,7 +16794,7 @@
                                     </p:anim>
                                     <p:anim calcmode="lin" valueType="num">
                                       <p:cBhvr additive="base">
-                                        <p:cTn id="28" dur="500" fill="hold"/>
+                                        <p:cTn id="40" dur="500" fill="hold"/>
                                         <p:tgtEl>
                                           <p:spTgt spid="684037"/>
                                         </p:tgtEl>
@@ -16307,32 +16825,59 @@
                     </p:cTn>
                   </p:par>
                   <p:par>
-                    <p:cTn id="29" fill="hold">
+                    <p:cTn id="41" fill="hold">
                       <p:stCondLst>
                         <p:cond delay="indefinite"/>
                       </p:stCondLst>
                       <p:childTnLst>
                         <p:par>
-                          <p:cTn id="30" fill="hold">
+                          <p:cTn id="42" fill="hold">
                             <p:stCondLst>
                               <p:cond delay="0"/>
                             </p:stCondLst>
                             <p:childTnLst>
                               <p:par>
-                                <p:cTn id="31" presetID="2" presetClass="entr" presetSubtype="4" fill="hold" grpId="0" nodeType="clickEffect">
+                                <p:cTn id="43" presetID="1" presetClass="entr" presetSubtype="0" fill="hold" grpId="0" nodeType="clickEffect">
                                   <p:stCondLst>
                                     <p:cond delay="0"/>
                                   </p:stCondLst>
                                   <p:childTnLst>
                                     <p:set>
                                       <p:cBhvr>
-                                        <p:cTn id="32" dur="1" fill="hold">
+                                        <p:cTn id="44" dur="1" fill="hold">
                                           <p:stCondLst>
                                             <p:cond delay="0"/>
                                           </p:stCondLst>
                                         </p:cTn>
                                         <p:tgtEl>
-                                          <p:spTgt spid="684047"/>
+                                          <p:spTgt spid="9228"/>
+                                        </p:tgtEl>
+                                        <p:attrNameLst>
+                                          <p:attrName>style.visibility</p:attrName>
+                                        </p:attrNameLst>
+                                      </p:cBhvr>
+                                      <p:to>
+                                        <p:strVal val="visible"/>
+                                      </p:to>
+                                    </p:set>
+                                  </p:childTnLst>
+                                </p:cTn>
+                              </p:par>
+                              <p:par>
+                                <p:cTn id="45" presetID="2" presetClass="entr" presetSubtype="4" fill="hold" grpId="0" nodeType="withEffect">
+                                  <p:stCondLst>
+                                    <p:cond delay="0"/>
+                                  </p:stCondLst>
+                                  <p:childTnLst>
+                                    <p:set>
+                                      <p:cBhvr>
+                                        <p:cTn id="46" dur="1" fill="hold">
+                                          <p:stCondLst>
+                                            <p:cond delay="0"/>
+                                          </p:stCondLst>
+                                        </p:cTn>
+                                        <p:tgtEl>
+                                          <p:spTgt spid="684038"/>
                                         </p:tgtEl>
                                         <p:attrNameLst>
                                           <p:attrName>style.visibility</p:attrName>
@@ -16344,9 +16889,9 @@
                                     </p:set>
                                     <p:anim calcmode="lin" valueType="num">
                                       <p:cBhvr additive="base">
-                                        <p:cTn id="33" dur="500" fill="hold"/>
+                                        <p:cTn id="47" dur="500" fill="hold"/>
                                         <p:tgtEl>
-                                          <p:spTgt spid="684047"/>
+                                          <p:spTgt spid="684038"/>
                                         </p:tgtEl>
                                         <p:attrNameLst>
                                           <p:attrName>ppt_x</p:attrName>
@@ -16367,9 +16912,127 @@
                                     </p:anim>
                                     <p:anim calcmode="lin" valueType="num">
                                       <p:cBhvr additive="base">
-                                        <p:cTn id="34" dur="500" fill="hold"/>
+                                        <p:cTn id="48" dur="500" fill="hold"/>
                                         <p:tgtEl>
-                                          <p:spTgt spid="684047"/>
+                                          <p:spTgt spid="684038"/>
+                                        </p:tgtEl>
+                                        <p:attrNameLst>
+                                          <p:attrName>ppt_y</p:attrName>
+                                        </p:attrNameLst>
+                                      </p:cBhvr>
+                                      <p:tavLst>
+                                        <p:tav tm="0">
+                                          <p:val>
+                                            <p:strVal val="1+#ppt_h/2"/>
+                                          </p:val>
+                                        </p:tav>
+                                        <p:tav tm="100000">
+                                          <p:val>
+                                            <p:strVal val="#ppt_y"/>
+                                          </p:val>
+                                        </p:tav>
+                                      </p:tavLst>
+                                    </p:anim>
+                                  </p:childTnLst>
+                                </p:cTn>
+                              </p:par>
+                            </p:childTnLst>
+                          </p:cTn>
+                        </p:par>
+                      </p:childTnLst>
+                    </p:cTn>
+                  </p:par>
+                  <p:par>
+                    <p:cTn id="49" fill="hold">
+                      <p:stCondLst>
+                        <p:cond delay="indefinite"/>
+                      </p:stCondLst>
+                      <p:childTnLst>
+                        <p:par>
+                          <p:cTn id="50" fill="hold">
+                            <p:stCondLst>
+                              <p:cond delay="0"/>
+                            </p:stCondLst>
+                            <p:childTnLst>
+                              <p:par>
+                                <p:cTn id="51" presetID="1" presetClass="entr" presetSubtype="0" fill="hold" grpId="0" nodeType="clickEffect">
+                                  <p:stCondLst>
+                                    <p:cond delay="0"/>
+                                  </p:stCondLst>
+                                  <p:childTnLst>
+                                    <p:set>
+                                      <p:cBhvr>
+                                        <p:cTn id="52" dur="1" fill="hold">
+                                          <p:stCondLst>
+                                            <p:cond delay="0"/>
+                                          </p:stCondLst>
+                                        </p:cTn>
+                                        <p:tgtEl>
+                                          <p:spTgt spid="9230"/>
+                                        </p:tgtEl>
+                                        <p:attrNameLst>
+                                          <p:attrName>style.visibility</p:attrName>
+                                        </p:attrNameLst>
+                                      </p:cBhvr>
+                                      <p:to>
+                                        <p:strVal val="visible"/>
+                                      </p:to>
+                                    </p:set>
+                                  </p:childTnLst>
+                                </p:cTn>
+                              </p:par>
+                              <p:par>
+                                <p:cTn id="53" presetID="2" presetClass="entr" presetSubtype="4" fill="hold" grpId="0" nodeType="withEffect">
+                                  <p:stCondLst>
+                                    <p:cond delay="0"/>
+                                  </p:stCondLst>
+                                  <p:childTnLst>
+                                    <p:set>
+                                      <p:cBhvr>
+                                        <p:cTn id="54" dur="1" fill="hold">
+                                          <p:stCondLst>
+                                            <p:cond delay="0"/>
+                                          </p:stCondLst>
+                                        </p:cTn>
+                                        <p:tgtEl>
+                                          <p:spTgt spid="684039"/>
+                                        </p:tgtEl>
+                                        <p:attrNameLst>
+                                          <p:attrName>style.visibility</p:attrName>
+                                        </p:attrNameLst>
+                                      </p:cBhvr>
+                                      <p:to>
+                                        <p:strVal val="visible"/>
+                                      </p:to>
+                                    </p:set>
+                                    <p:anim calcmode="lin" valueType="num">
+                                      <p:cBhvr additive="base">
+                                        <p:cTn id="55" dur="500" fill="hold"/>
+                                        <p:tgtEl>
+                                          <p:spTgt spid="684039"/>
+                                        </p:tgtEl>
+                                        <p:attrNameLst>
+                                          <p:attrName>ppt_x</p:attrName>
+                                        </p:attrNameLst>
+                                      </p:cBhvr>
+                                      <p:tavLst>
+                                        <p:tav tm="0">
+                                          <p:val>
+                                            <p:strVal val="#ppt_x"/>
+                                          </p:val>
+                                        </p:tav>
+                                        <p:tav tm="100000">
+                                          <p:val>
+                                            <p:strVal val="#ppt_x"/>
+                                          </p:val>
+                                        </p:tav>
+                                      </p:tavLst>
+                                    </p:anim>
+                                    <p:anim calcmode="lin" valueType="num">
+                                      <p:cBhvr additive="base">
+                                        <p:cTn id="56" dur="500" fill="hold"/>
+                                        <p:tgtEl>
+                                          <p:spTgt spid="684039"/>
                                         </p:tgtEl>
                                         <p:attrNameLst>
                                           <p:attrName>ppt_y</p:attrName>
@@ -16425,6 +17088,12 @@
       <p:bldP spid="684038" grpId="0"/>
       <p:bldP spid="684039" grpId="0"/>
       <p:bldP spid="684040" grpId="0"/>
+      <p:bldP spid="9225" grpId="0"/>
+      <p:bldP spid="9226" grpId="0"/>
+      <p:bldP spid="9227" grpId="0"/>
+      <p:bldP spid="9228" grpId="0"/>
+      <p:bldP spid="9229" grpId="0"/>
+      <p:bldP spid="9230" grpId="0"/>
       <p:bldP spid="684047" grpId="0"/>
     </p:bldLst>
   </p:timing>

</xml_diff>